<commit_message>
Deployed 4cae531 with MkDocs version: 1.5.3
</commit_message>
<xml_diff>
--- a/slides/slides.pptx
+++ b/slides/slides.pptx
@@ -13,6 +13,7 @@
     <p:sldId id="261" r:id="rId11"/>
     <p:sldId id="262" r:id="rId12"/>
     <p:sldId id="263" r:id="rId13"/>
+    <p:sldId id="264" r:id="rId14"/>
   </p:sldIdLst>
   <p:sldSz cx="4610100" cy="3460750"/>
   <p:notesSz cx="4610100" cy="3460750"/>
@@ -232,7 +233,7 @@
             </a:r>
             <a:r>
               <a:rPr dirty="0" spc="-50"/>
-              <a:t>8</a:t>
+              <a:t>9</a:t>
             </a:r>
           </a:p>
         </p:txBody>
@@ -433,7 +434,7 @@
             </a:r>
             <a:r>
               <a:rPr dirty="0" spc="-50"/>
-              <a:t>8</a:t>
+              <a:t>9</a:t>
             </a:r>
           </a:p>
         </p:txBody>
@@ -669,7 +670,7 @@
             </a:r>
             <a:r>
               <a:rPr dirty="0" spc="-50"/>
-              <a:t>8</a:t>
+              <a:t>9</a:t>
             </a:r>
           </a:p>
         </p:txBody>
@@ -895,7 +896,7 @@
             </a:r>
             <a:r>
               <a:rPr dirty="0" spc="-50"/>
-              <a:t>8</a:t>
+              <a:t>9</a:t>
             </a:r>
           </a:p>
         </p:txBody>
@@ -1042,7 +1043,7 @@
             </a:r>
             <a:r>
               <a:rPr dirty="0" spc="-50"/>
-              <a:t>8</a:t>
+              <a:t>9</a:t>
             </a:r>
           </a:p>
         </p:txBody>
@@ -1162,8 +1163,8 @@
         </p:nvSpPr>
         <p:spPr>
           <a:xfrm>
-            <a:off x="189649" y="39177"/>
-            <a:ext cx="2618105" cy="207645"/>
+            <a:off x="215049" y="39177"/>
+            <a:ext cx="2571115" cy="207645"/>
           </a:xfrm>
           <a:prstGeom prst="rect">
             <a:avLst/>
@@ -1371,7 +1372,7 @@
             </a:r>
             <a:r>
               <a:rPr dirty="0" spc="-50"/>
-              <a:t>8</a:t>
+              <a:t>9</a:t>
             </a:r>
           </a:p>
         </p:txBody>
@@ -1816,7 +1817,7 @@
         <p:spPr>
           <a:xfrm>
             <a:off x="344004" y="1970856"/>
-            <a:ext cx="927735" cy="438150"/>
+            <a:ext cx="987425" cy="438150"/>
           </a:xfrm>
           <a:prstGeom prst="rect">
             <a:avLst/>
@@ -1828,7 +1829,7 @@
           </a:bodyPr>
           <a:lstStyle/>
           <a:p>
-            <a:pPr marL="15875" marR="5080" indent="-3810">
+            <a:pPr marL="12700" marR="5080" indent="-635">
               <a:lnSpc>
                 <a:spcPct val="135300"/>
               </a:lnSpc>
@@ -1877,26 +1878,6 @@
               <a:t> </a:t>
             </a:r>
             <a:r>
-              <a:rPr dirty="0" sz="1000">
-                <a:solidFill>
-                  <a:srgbClr val="22373A"/>
-                </a:solidFill>
-                <a:latin typeface="Georgia"/>
-                <a:cs typeface="Georgia"/>
-              </a:rPr>
-              <a:t>9</a:t>
-            </a:r>
-            <a:r>
-              <a:rPr dirty="0" sz="1000" spc="10">
-                <a:solidFill>
-                  <a:srgbClr val="22373A"/>
-                </a:solidFill>
-                <a:latin typeface="Georgia"/>
-                <a:cs typeface="Georgia"/>
-              </a:rPr>
-              <a:t> </a:t>
-            </a:r>
-            <a:r>
               <a:rPr dirty="0" sz="1000" spc="-10">
                 <a:solidFill>
                   <a:srgbClr val="22373A"/>
@@ -1904,10 +1885,10 @@
                 <a:latin typeface="Georgia"/>
                 <a:cs typeface="Georgia"/>
               </a:rPr>
-              <a:t>February</a:t>
-            </a:r>
-            <a:r>
-              <a:rPr dirty="0" sz="1000" spc="10">
+              <a:t>23 February</a:t>
+            </a:r>
+            <a:r>
+              <a:rPr dirty="0" sz="1000" spc="-5">
                 <a:solidFill>
                   <a:srgbClr val="22373A"/>
                 </a:solidFill>
@@ -1986,7 +1967,7 @@
             </a:r>
             <a:r>
               <a:rPr dirty="0" spc="-50"/>
-              <a:t>8</a:t>
+              <a:t>9</a:t>
             </a:r>
           </a:p>
         </p:txBody>
@@ -2038,7 +2019,7 @@
           </a:bodyPr>
           <a:lstStyle/>
           <a:p>
-            <a:pPr marL="38100">
+            <a:pPr marL="12700">
               <a:lnSpc>
                 <a:spcPct val="100000"/>
               </a:lnSpc>
@@ -2115,7 +2096,7 @@
         </p:nvSpPr>
         <p:spPr>
           <a:xfrm>
-            <a:off x="421957" y="612645"/>
+            <a:off x="421957" y="608797"/>
             <a:ext cx="3883660" cy="2400300"/>
           </a:xfrm>
           <a:prstGeom prst="rect">
@@ -3018,7 +2999,7 @@
             </a:endParaRPr>
           </a:p>
           <a:p>
-            <a:pPr marL="212725" marR="50165" indent="-175260">
+            <a:pPr marL="212725" marR="66040" indent="-175260">
               <a:lnSpc>
                 <a:spcPct val="118000"/>
               </a:lnSpc>
@@ -3029,14 +3010,14 @@
               </a:tabLst>
             </a:pPr>
             <a:r>
-              <a:rPr dirty="0" sz="1100" b="1">
-                <a:solidFill>
-                  <a:srgbClr val="22373A"/>
-                </a:solidFill>
-                <a:latin typeface="Georgia"/>
-                <a:cs typeface="Georgia"/>
-              </a:rPr>
-              <a:t>10</a:t>
+              <a:rPr dirty="0" sz="1100" spc="105" b="1">
+                <a:solidFill>
+                  <a:srgbClr val="22373A"/>
+                </a:solidFill>
+                <a:latin typeface="Georgia"/>
+                <a:cs typeface="Georgia"/>
+              </a:rPr>
+              <a:t>A</a:t>
             </a:r>
             <a:r>
               <a:rPr dirty="0" sz="1100" spc="60" b="1">
@@ -3049,6 +3030,26 @@
               <a:t> </a:t>
             </a:r>
             <a:r>
+              <a:rPr dirty="0" sz="1100" spc="-20" b="1">
+                <a:solidFill>
+                  <a:srgbClr val="22373A"/>
+                </a:solidFill>
+                <a:latin typeface="Georgia"/>
+                <a:cs typeface="Georgia"/>
+              </a:rPr>
+              <a:t>Dozen</a:t>
+            </a:r>
+            <a:r>
+              <a:rPr dirty="0" sz="1100" spc="60" b="1">
+                <a:solidFill>
+                  <a:srgbClr val="22373A"/>
+                </a:solidFill>
+                <a:latin typeface="Georgia"/>
+                <a:cs typeface="Georgia"/>
+              </a:rPr>
+              <a:t> </a:t>
+            </a:r>
+            <a:r>
               <a:rPr dirty="0" sz="1100" spc="-10" b="1">
                 <a:solidFill>
                   <a:srgbClr val="22373A"/>
@@ -3079,6 +3080,26 @@
               <a:t> </a:t>
             </a:r>
             <a:r>
+              <a:rPr dirty="0" sz="1100" spc="-20">
+                <a:solidFill>
+                  <a:srgbClr val="22373A"/>
+                </a:solidFill>
+                <a:latin typeface="Georgia"/>
+                <a:cs typeface="Georgia"/>
+              </a:rPr>
+              <a:t>Bookmarks,</a:t>
+            </a:r>
+            <a:r>
+              <a:rPr dirty="0" sz="1100" spc="30">
+                <a:solidFill>
+                  <a:srgbClr val="22373A"/>
+                </a:solidFill>
+                <a:latin typeface="Georgia"/>
+                <a:cs typeface="Georgia"/>
+              </a:rPr>
+              <a:t> </a:t>
+            </a:r>
+            <a:r>
               <a:rPr dirty="0" sz="1100">
                 <a:solidFill>
                   <a:srgbClr val="22373A"/>
@@ -3086,7 +3107,7 @@
                 <a:latin typeface="Georgia"/>
                 <a:cs typeface="Georgia"/>
               </a:rPr>
-              <a:t>Title</a:t>
+              <a:t>title</a:t>
             </a:r>
             <a:r>
               <a:rPr dirty="0" sz="1100" spc="30">
@@ -3159,6 +3180,26 @@
               <a:t> </a:t>
             </a:r>
             <a:r>
+              <a:rPr dirty="0" sz="1100" spc="-25">
+                <a:solidFill>
+                  <a:srgbClr val="22373A"/>
+                </a:solidFill>
+                <a:latin typeface="Georgia"/>
+                <a:cs typeface="Georgia"/>
+              </a:rPr>
+              <a:t>on </a:t>
+            </a:r>
+            <a:r>
+              <a:rPr dirty="0" sz="1100" spc="-25">
+                <a:solidFill>
+                  <a:srgbClr val="22373A"/>
+                </a:solidFill>
+                <a:latin typeface="Georgia"/>
+                <a:cs typeface="Georgia"/>
+              </a:rPr>
+              <a:t>	</a:t>
+            </a:r>
+            <a:r>
               <a:rPr dirty="0" sz="1100">
                 <a:solidFill>
                   <a:srgbClr val="22373A"/>
@@ -3166,7 +3207,7 @@
                 <a:latin typeface="Georgia"/>
                 <a:cs typeface="Georgia"/>
               </a:rPr>
-              <a:t>on</a:t>
+              <a:t>title,</a:t>
             </a:r>
             <a:r>
               <a:rPr dirty="0" sz="1100" spc="30">
@@ -3179,6 +3220,146 @@
               <a:t> </a:t>
             </a:r>
             <a:r>
+              <a:rPr dirty="0" sz="1100" spc="-25">
+                <a:solidFill>
+                  <a:srgbClr val="22373A"/>
+                </a:solidFill>
+                <a:latin typeface="Georgia"/>
+                <a:cs typeface="Georgia"/>
+              </a:rPr>
+              <a:t>background</a:t>
+            </a:r>
+            <a:r>
+              <a:rPr dirty="0" sz="1100" spc="35">
+                <a:solidFill>
+                  <a:srgbClr val="22373A"/>
+                </a:solidFill>
+                <a:latin typeface="Georgia"/>
+                <a:cs typeface="Georgia"/>
+              </a:rPr>
+              <a:t> </a:t>
+            </a:r>
+            <a:r>
+              <a:rPr dirty="0" sz="1100" spc="-20">
+                <a:solidFill>
+                  <a:srgbClr val="22373A"/>
+                </a:solidFill>
+                <a:latin typeface="Georgia"/>
+                <a:cs typeface="Georgia"/>
+              </a:rPr>
+              <a:t>shading,</a:t>
+            </a:r>
+            <a:r>
+              <a:rPr dirty="0" sz="1100" spc="35">
+                <a:solidFill>
+                  <a:srgbClr val="22373A"/>
+                </a:solidFill>
+                <a:latin typeface="Georgia"/>
+                <a:cs typeface="Georgia"/>
+              </a:rPr>
+              <a:t> </a:t>
+            </a:r>
+            <a:r>
+              <a:rPr dirty="0" sz="1100" spc="-35">
+                <a:solidFill>
+                  <a:srgbClr val="22373A"/>
+                </a:solidFill>
+                <a:latin typeface="Georgia"/>
+                <a:cs typeface="Georgia"/>
+              </a:rPr>
+              <a:t>embedded</a:t>
+            </a:r>
+            <a:r>
+              <a:rPr dirty="0" sz="1100" spc="35">
+                <a:solidFill>
+                  <a:srgbClr val="22373A"/>
+                </a:solidFill>
+                <a:latin typeface="Georgia"/>
+                <a:cs typeface="Georgia"/>
+              </a:rPr>
+              <a:t> </a:t>
+            </a:r>
+            <a:r>
+              <a:rPr dirty="0" sz="1100" spc="-20">
+                <a:solidFill>
+                  <a:srgbClr val="22373A"/>
+                </a:solidFill>
+                <a:latin typeface="Georgia"/>
+                <a:cs typeface="Georgia"/>
+              </a:rPr>
+              <a:t>image,</a:t>
+            </a:r>
+            <a:r>
+              <a:rPr dirty="0" sz="1100" spc="35">
+                <a:solidFill>
+                  <a:srgbClr val="22373A"/>
+                </a:solidFill>
+                <a:latin typeface="Georgia"/>
+                <a:cs typeface="Georgia"/>
+              </a:rPr>
+              <a:t> </a:t>
+            </a:r>
+            <a:r>
+              <a:rPr dirty="0" sz="1100" spc="-10">
+                <a:solidFill>
+                  <a:srgbClr val="22373A"/>
+                </a:solidFill>
+                <a:latin typeface="Georgia"/>
+                <a:cs typeface="Georgia"/>
+              </a:rPr>
+              <a:t>citation</a:t>
+            </a:r>
+            <a:r>
+              <a:rPr dirty="0" baseline="27777" sz="1200" spc="-15">
+                <a:solidFill>
+                  <a:srgbClr val="22373A"/>
+                </a:solidFill>
+                <a:latin typeface="Georgia"/>
+                <a:cs typeface="Georgia"/>
+              </a:rPr>
+              <a:t>1</a:t>
+            </a:r>
+            <a:r>
+              <a:rPr dirty="0" sz="1100" spc="-10">
+                <a:solidFill>
+                  <a:srgbClr val="22373A"/>
+                </a:solidFill>
+                <a:latin typeface="Georgia"/>
+                <a:cs typeface="Georgia"/>
+              </a:rPr>
+              <a:t>, </a:t>
+            </a:r>
+            <a:r>
+              <a:rPr dirty="0" sz="1100" spc="-10">
+                <a:solidFill>
+                  <a:srgbClr val="22373A"/>
+                </a:solidFill>
+                <a:latin typeface="Georgia"/>
+                <a:cs typeface="Georgia"/>
+              </a:rPr>
+              <a:t>	</a:t>
+            </a:r>
+            <a:r>
+              <a:rPr dirty="0" sz="1100" spc="-25">
+                <a:solidFill>
+                  <a:srgbClr val="22373A"/>
+                </a:solidFill>
+                <a:latin typeface="Georgia"/>
+                <a:cs typeface="Georgia"/>
+              </a:rPr>
+              <a:t>colored</a:t>
+            </a:r>
+            <a:r>
+              <a:rPr dirty="0" sz="1100" spc="40">
+                <a:solidFill>
+                  <a:srgbClr val="22373A"/>
+                </a:solidFill>
+                <a:latin typeface="Georgia"/>
+                <a:cs typeface="Georgia"/>
+              </a:rPr>
+              <a:t> </a:t>
+            </a:r>
+            <a:r>
               <a:rPr dirty="0" sz="1100">
                 <a:solidFill>
                   <a:srgbClr val="22373A"/>
@@ -3186,10 +3367,90 @@
                 <a:latin typeface="Georgia"/>
                 <a:cs typeface="Georgia"/>
               </a:rPr>
-              <a:t>title,</a:t>
-            </a:r>
-            <a:r>
-              <a:rPr dirty="0" sz="1100" spc="30">
+              <a:t>URLs,</a:t>
+            </a:r>
+            <a:r>
+              <a:rPr dirty="0" sz="1100" spc="40">
+                <a:solidFill>
+                  <a:srgbClr val="22373A"/>
+                </a:solidFill>
+                <a:latin typeface="Georgia"/>
+                <a:cs typeface="Georgia"/>
+              </a:rPr>
+              <a:t> </a:t>
+            </a:r>
+            <a:r>
+              <a:rPr dirty="0" sz="1100" spc="-25">
+                <a:solidFill>
+                  <a:srgbClr val="22373A"/>
+                </a:solidFill>
+                <a:latin typeface="Georgia"/>
+                <a:cs typeface="Georgia"/>
+              </a:rPr>
+              <a:t>figure</a:t>
+            </a:r>
+            <a:r>
+              <a:rPr dirty="0" sz="1100" spc="40">
+                <a:solidFill>
+                  <a:srgbClr val="22373A"/>
+                </a:solidFill>
+                <a:latin typeface="Georgia"/>
+                <a:cs typeface="Georgia"/>
+              </a:rPr>
+              <a:t> </a:t>
+            </a:r>
+            <a:r>
+              <a:rPr dirty="0" sz="1100" spc="-35">
+                <a:solidFill>
+                  <a:srgbClr val="22373A"/>
+                </a:solidFill>
+                <a:latin typeface="Georgia"/>
+                <a:cs typeface="Georgia"/>
+              </a:rPr>
+              <a:t>numbering,</a:t>
+            </a:r>
+            <a:r>
+              <a:rPr dirty="0" sz="1100" spc="40">
+                <a:solidFill>
+                  <a:srgbClr val="22373A"/>
+                </a:solidFill>
+                <a:latin typeface="Georgia"/>
+                <a:cs typeface="Georgia"/>
+              </a:rPr>
+              <a:t> </a:t>
+            </a:r>
+            <a:r>
+              <a:rPr dirty="0" sz="1100">
+                <a:solidFill>
+                  <a:srgbClr val="22373A"/>
+                </a:solidFill>
+                <a:latin typeface="Georgia"/>
+                <a:cs typeface="Georgia"/>
+              </a:rPr>
+              <a:t>table</a:t>
+            </a:r>
+            <a:r>
+              <a:rPr dirty="0" sz="1100" spc="40">
+                <a:solidFill>
+                  <a:srgbClr val="22373A"/>
+                </a:solidFill>
+                <a:latin typeface="Georgia"/>
+                <a:cs typeface="Georgia"/>
+              </a:rPr>
+              <a:t> </a:t>
+            </a:r>
+            <a:r>
+              <a:rPr dirty="0" sz="1100" spc="-35">
+                <a:solidFill>
+                  <a:srgbClr val="22373A"/>
+                </a:solidFill>
+                <a:latin typeface="Georgia"/>
+                <a:cs typeface="Georgia"/>
+              </a:rPr>
+              <a:t>numbering,</a:t>
+            </a:r>
+            <a:r>
+              <a:rPr dirty="0" sz="1100" spc="45">
                 <a:solidFill>
                   <a:srgbClr val="22373A"/>
                 </a:solidFill>
@@ -3206,7 +3467,7 @@
                 <a:latin typeface="Georgia"/>
                 <a:cs typeface="Georgia"/>
               </a:rPr>
-              <a:t>background </a:t>
+              <a:t>multiple </a:t>
             </a:r>
             <a:r>
               <a:rPr dirty="0" sz="1100" spc="-10">
@@ -3219,17 +3480,77 @@
               <a:t>	</a:t>
             </a:r>
             <a:r>
-              <a:rPr dirty="0" sz="1100" spc="-20">
-                <a:solidFill>
-                  <a:srgbClr val="22373A"/>
-                </a:solidFill>
-                <a:latin typeface="Georgia"/>
-                <a:cs typeface="Georgia"/>
-              </a:rPr>
-              <a:t>shading,</a:t>
-            </a:r>
-            <a:r>
-              <a:rPr dirty="0" sz="1100" spc="35">
+              <a:rPr dirty="0" sz="1100" spc="-30">
+                <a:solidFill>
+                  <a:srgbClr val="22373A"/>
+                </a:solidFill>
+                <a:latin typeface="Georgia"/>
+                <a:cs typeface="Georgia"/>
+              </a:rPr>
+              <a:t>columns,</a:t>
+            </a:r>
+            <a:r>
+              <a:rPr dirty="0" sz="1100" spc="50">
+                <a:solidFill>
+                  <a:srgbClr val="22373A"/>
+                </a:solidFill>
+                <a:latin typeface="Georgia"/>
+                <a:cs typeface="Georgia"/>
+              </a:rPr>
+              <a:t> </a:t>
+            </a:r>
+            <a:r>
+              <a:rPr dirty="0" sz="1100">
+                <a:solidFill>
+                  <a:srgbClr val="22373A"/>
+                </a:solidFill>
+                <a:latin typeface="Georgia"/>
+                <a:cs typeface="Georgia"/>
+              </a:rPr>
+              <a:t>page</a:t>
+            </a:r>
+            <a:r>
+              <a:rPr dirty="0" sz="1100" spc="55">
+                <a:solidFill>
+                  <a:srgbClr val="22373A"/>
+                </a:solidFill>
+                <a:latin typeface="Georgia"/>
+                <a:cs typeface="Georgia"/>
+              </a:rPr>
+              <a:t> </a:t>
+            </a:r>
+            <a:r>
+              <a:rPr dirty="0" sz="1100">
+                <a:solidFill>
+                  <a:srgbClr val="22373A"/>
+                </a:solidFill>
+                <a:latin typeface="Georgia"/>
+                <a:cs typeface="Georgia"/>
+              </a:rPr>
+              <a:t>/</a:t>
+            </a:r>
+            <a:r>
+              <a:rPr dirty="0" sz="1100" spc="50">
+                <a:solidFill>
+                  <a:srgbClr val="22373A"/>
+                </a:solidFill>
+                <a:latin typeface="Georgia"/>
+                <a:cs typeface="Georgia"/>
+              </a:rPr>
+              <a:t> </a:t>
+            </a:r>
+            <a:r>
+              <a:rPr dirty="0" sz="1100">
+                <a:solidFill>
+                  <a:srgbClr val="22373A"/>
+                </a:solidFill>
+                <a:latin typeface="Georgia"/>
+                <a:cs typeface="Georgia"/>
+              </a:rPr>
+              <a:t>total</a:t>
+            </a:r>
+            <a:r>
+              <a:rPr dirty="0" sz="1100" spc="55">
                 <a:solidFill>
                   <a:srgbClr val="22373A"/>
                 </a:solidFill>
@@ -3246,30 +3567,10 @@
                 <a:latin typeface="Georgia"/>
                 <a:cs typeface="Georgia"/>
               </a:rPr>
-              <a:t>embedded</a:t>
-            </a:r>
-            <a:r>
-              <a:rPr dirty="0" sz="1100" spc="40">
-                <a:solidFill>
-                  <a:srgbClr val="22373A"/>
-                </a:solidFill>
-                <a:latin typeface="Georgia"/>
-                <a:cs typeface="Georgia"/>
-              </a:rPr>
-              <a:t> </a:t>
-            </a:r>
-            <a:r>
-              <a:rPr dirty="0" sz="1100" spc="-20">
-                <a:solidFill>
-                  <a:srgbClr val="22373A"/>
-                </a:solidFill>
-                <a:latin typeface="Georgia"/>
-                <a:cs typeface="Georgia"/>
-              </a:rPr>
-              <a:t>image,</a:t>
-            </a:r>
-            <a:r>
-              <a:rPr dirty="0" sz="1100" spc="40">
+              <a:t>numbering,</a:t>
+            </a:r>
+            <a:r>
+              <a:rPr dirty="0" sz="1100" spc="50">
                 <a:solidFill>
                   <a:srgbClr val="22373A"/>
                 </a:solidFill>
@@ -3286,17 +3587,17 @@
                 <a:latin typeface="Georgia"/>
                 <a:cs typeface="Georgia"/>
               </a:rPr>
-              <a:t>citation</a:t>
-            </a:r>
-            <a:r>
-              <a:rPr dirty="0" baseline="27777" sz="1200">
-                <a:solidFill>
-                  <a:srgbClr val="22373A"/>
-                </a:solidFill>
-                <a:latin typeface="Georgia"/>
-                <a:cs typeface="Georgia"/>
-              </a:rPr>
-              <a:t>1</a:t>
+              <a:t>link</a:t>
+            </a:r>
+            <a:r>
+              <a:rPr dirty="0" sz="1100" spc="55">
+                <a:solidFill>
+                  <a:srgbClr val="22373A"/>
+                </a:solidFill>
+                <a:latin typeface="Georgia"/>
+                <a:cs typeface="Georgia"/>
+              </a:rPr>
+              <a:t> </a:t>
             </a:r>
             <a:r>
               <a:rPr dirty="0" sz="1100">
@@ -3306,50 +3607,10 @@
                 <a:latin typeface="Georgia"/>
                 <a:cs typeface="Georgia"/>
               </a:rPr>
-              <a:t>,</a:t>
-            </a:r>
-            <a:r>
-              <a:rPr dirty="0" sz="1100" spc="40">
-                <a:solidFill>
-                  <a:srgbClr val="22373A"/>
-                </a:solidFill>
-                <a:latin typeface="Georgia"/>
-                <a:cs typeface="Georgia"/>
-              </a:rPr>
-              <a:t> </a:t>
-            </a:r>
-            <a:r>
-              <a:rPr dirty="0" sz="1100" spc="-25">
-                <a:solidFill>
-                  <a:srgbClr val="22373A"/>
-                </a:solidFill>
-                <a:latin typeface="Georgia"/>
-                <a:cs typeface="Georgia"/>
-              </a:rPr>
-              <a:t>colored</a:t>
-            </a:r>
-            <a:r>
-              <a:rPr dirty="0" sz="1100" spc="40">
-                <a:solidFill>
-                  <a:srgbClr val="22373A"/>
-                </a:solidFill>
-                <a:latin typeface="Georgia"/>
-                <a:cs typeface="Georgia"/>
-              </a:rPr>
-              <a:t> </a:t>
-            </a:r>
-            <a:r>
-              <a:rPr dirty="0" sz="1100">
-                <a:solidFill>
-                  <a:srgbClr val="22373A"/>
-                </a:solidFill>
-                <a:latin typeface="Georgia"/>
-                <a:cs typeface="Georgia"/>
-              </a:rPr>
-              <a:t>URLs,</a:t>
-            </a:r>
-            <a:r>
-              <a:rPr dirty="0" sz="1100" spc="40">
+              <a:t>to</a:t>
+            </a:r>
+            <a:r>
+              <a:rPr dirty="0" sz="1100" spc="55">
                 <a:solidFill>
                   <a:srgbClr val="22373A"/>
                 </a:solidFill>
@@ -3366,167 +3627,7 @@
                 <a:latin typeface="Georgia"/>
                 <a:cs typeface="Georgia"/>
               </a:rPr>
-              <a:t>figure </a:t>
-            </a:r>
-            <a:r>
-              <a:rPr dirty="0" sz="1100" spc="-10">
-                <a:solidFill>
-                  <a:srgbClr val="22373A"/>
-                </a:solidFill>
-                <a:latin typeface="Georgia"/>
-                <a:cs typeface="Georgia"/>
-              </a:rPr>
-              <a:t>	</a:t>
-            </a:r>
-            <a:r>
-              <a:rPr dirty="0" sz="1100" spc="-40">
-                <a:solidFill>
-                  <a:srgbClr val="22373A"/>
-                </a:solidFill>
-                <a:latin typeface="Georgia"/>
-                <a:cs typeface="Georgia"/>
-              </a:rPr>
-              <a:t>numbering,</a:t>
-            </a:r>
-            <a:r>
-              <a:rPr dirty="0" sz="1100" spc="35">
-                <a:solidFill>
-                  <a:srgbClr val="22373A"/>
-                </a:solidFill>
-                <a:latin typeface="Georgia"/>
-                <a:cs typeface="Georgia"/>
-              </a:rPr>
-              <a:t> </a:t>
-            </a:r>
-            <a:r>
-              <a:rPr dirty="0" sz="1100">
-                <a:solidFill>
-                  <a:srgbClr val="22373A"/>
-                </a:solidFill>
-                <a:latin typeface="Georgia"/>
-                <a:cs typeface="Georgia"/>
-              </a:rPr>
-              <a:t>table</a:t>
-            </a:r>
-            <a:r>
-              <a:rPr dirty="0" sz="1100" spc="40">
-                <a:solidFill>
-                  <a:srgbClr val="22373A"/>
-                </a:solidFill>
-                <a:latin typeface="Georgia"/>
-                <a:cs typeface="Georgia"/>
-              </a:rPr>
-              <a:t> </a:t>
-            </a:r>
-            <a:r>
-              <a:rPr dirty="0" sz="1100" spc="-40">
-                <a:solidFill>
-                  <a:srgbClr val="22373A"/>
-                </a:solidFill>
-                <a:latin typeface="Georgia"/>
-                <a:cs typeface="Georgia"/>
-              </a:rPr>
-              <a:t>numbering,</a:t>
-            </a:r>
-            <a:r>
-              <a:rPr dirty="0" sz="1100" spc="40">
-                <a:solidFill>
-                  <a:srgbClr val="22373A"/>
-                </a:solidFill>
-                <a:latin typeface="Georgia"/>
-                <a:cs typeface="Georgia"/>
-              </a:rPr>
-              <a:t> </a:t>
-            </a:r>
-            <a:r>
-              <a:rPr dirty="0" sz="1100" spc="-25">
-                <a:solidFill>
-                  <a:srgbClr val="22373A"/>
-                </a:solidFill>
-                <a:latin typeface="Georgia"/>
-                <a:cs typeface="Georgia"/>
-              </a:rPr>
-              <a:t>multiple</a:t>
-            </a:r>
-            <a:r>
-              <a:rPr dirty="0" sz="1100" spc="35">
-                <a:solidFill>
-                  <a:srgbClr val="22373A"/>
-                </a:solidFill>
-                <a:latin typeface="Georgia"/>
-                <a:cs typeface="Georgia"/>
-              </a:rPr>
-              <a:t> </a:t>
-            </a:r>
-            <a:r>
-              <a:rPr dirty="0" sz="1100" spc="-35">
-                <a:solidFill>
-                  <a:srgbClr val="22373A"/>
-                </a:solidFill>
-                <a:latin typeface="Georgia"/>
-                <a:cs typeface="Georgia"/>
-              </a:rPr>
-              <a:t>columns,</a:t>
-            </a:r>
-            <a:r>
-              <a:rPr dirty="0" sz="1100" spc="40">
-                <a:solidFill>
-                  <a:srgbClr val="22373A"/>
-                </a:solidFill>
-                <a:latin typeface="Georgia"/>
-                <a:cs typeface="Georgia"/>
-              </a:rPr>
-              <a:t> </a:t>
-            </a:r>
-            <a:r>
-              <a:rPr dirty="0" sz="1100" spc="-10">
-                <a:solidFill>
-                  <a:srgbClr val="22373A"/>
-                </a:solidFill>
-                <a:latin typeface="Georgia"/>
-                <a:cs typeface="Georgia"/>
-              </a:rPr>
-              <a:t>page</a:t>
-            </a:r>
-            <a:r>
-              <a:rPr dirty="0" sz="1100" spc="40">
-                <a:solidFill>
-                  <a:srgbClr val="22373A"/>
-                </a:solidFill>
-                <a:latin typeface="Georgia"/>
-                <a:cs typeface="Georgia"/>
-              </a:rPr>
-              <a:t> </a:t>
-            </a:r>
-            <a:r>
-              <a:rPr dirty="0" sz="1100">
-                <a:solidFill>
-                  <a:srgbClr val="22373A"/>
-                </a:solidFill>
-                <a:latin typeface="Georgia"/>
-                <a:cs typeface="Georgia"/>
-              </a:rPr>
-              <a:t>/</a:t>
-            </a:r>
-            <a:r>
-              <a:rPr dirty="0" sz="1100" spc="35">
-                <a:solidFill>
-                  <a:srgbClr val="22373A"/>
-                </a:solidFill>
-                <a:latin typeface="Georgia"/>
-                <a:cs typeface="Georgia"/>
-              </a:rPr>
-              <a:t> </a:t>
-            </a:r>
-            <a:r>
-              <a:rPr dirty="0" sz="1100" spc="-10">
-                <a:solidFill>
-                  <a:srgbClr val="22373A"/>
-                </a:solidFill>
-                <a:latin typeface="Georgia"/>
-                <a:cs typeface="Georgia"/>
-              </a:rPr>
-              <a:t>total 	numbering.</a:t>
+              <a:t>videos.</a:t>
             </a:r>
             <a:endParaRPr sz="1100">
               <a:latin typeface="Georgia"/>
@@ -3588,7 +3689,7 @@
             </a:r>
             <a:r>
               <a:rPr dirty="0" spc="-50"/>
-              <a:t>8</a:t>
+              <a:t>9</a:t>
             </a:r>
           </a:p>
         </p:txBody>
@@ -3900,7 +4001,7 @@
             </a:r>
             <a:r>
               <a:rPr dirty="0" spc="-50"/>
-              <a:t>8</a:t>
+              <a:t>9</a:t>
             </a:r>
           </a:p>
         </p:txBody>
@@ -3952,7 +4053,7 @@
           </a:bodyPr>
           <a:lstStyle/>
           <a:p>
-            <a:pPr marL="38100">
+            <a:pPr marL="12700">
               <a:lnSpc>
                 <a:spcPct val="100000"/>
               </a:lnSpc>
@@ -3965,7 +4066,7 @@
               <a:t>Code/Math</a:t>
             </a:r>
             <a:r>
-              <a:rPr dirty="0" spc="60"/>
+              <a:rPr dirty="0" spc="160"/>
               <a:t> </a:t>
             </a:r>
             <a:r>
@@ -3977,94 +4078,55 @@
                 <a:latin typeface="Calibri"/>
                 <a:cs typeface="Calibri"/>
               </a:rPr>
-              <a:t>a</a:t>
-            </a:r>
-            <a:r>
-              <a:rPr dirty="0" baseline="31250" sz="1200" b="0">
-                <a:latin typeface="Georgia"/>
-                <a:cs typeface="Georgia"/>
-              </a:rPr>
-              <a:t>2</a:t>
-            </a:r>
-            <a:r>
-              <a:rPr dirty="0" baseline="31250" sz="1200" spc="127" b="0">
-                <a:latin typeface="Georgia"/>
-                <a:cs typeface="Georgia"/>
-              </a:rPr>
-              <a:t> </a:t>
-            </a:r>
-            <a:r>
-              <a:rPr dirty="0" sz="1200" spc="-55" b="0">
-                <a:latin typeface="Lucida Sans Unicode"/>
-                <a:cs typeface="Lucida Sans Unicode"/>
-              </a:rPr>
-              <a:t>+</a:t>
-            </a:r>
-            <a:r>
-              <a:rPr dirty="0" sz="1200" spc="-114" b="0">
-                <a:latin typeface="Lucida Sans Unicode"/>
-                <a:cs typeface="Lucida Sans Unicode"/>
-              </a:rPr>
-              <a:t> </a:t>
-            </a:r>
-            <a:r>
-              <a:rPr dirty="0" sz="1200" spc="-10" b="0" i="1">
+              <a:t>φ</a:t>
+            </a:r>
+            <a:r>
+              <a:rPr dirty="0" b="0">
+                <a:latin typeface="Tahoma"/>
+                <a:cs typeface="Tahoma"/>
+              </a:rPr>
+              <a:t>(</a:t>
+            </a:r>
+            <a:r>
+              <a:rPr dirty="0" b="0" i="1">
                 <a:latin typeface="Calibri"/>
                 <a:cs typeface="Calibri"/>
               </a:rPr>
-              <a:t>b</a:t>
-            </a:r>
-            <a:r>
-              <a:rPr dirty="0" baseline="31250" sz="1200" spc="-15" b="0">
-                <a:latin typeface="Georgia"/>
-                <a:cs typeface="Georgia"/>
-              </a:rPr>
-              <a:t>2</a:t>
-            </a:r>
-            <a:r>
-              <a:rPr dirty="0" baseline="31250" sz="1200" spc="225" b="0">
-                <a:latin typeface="Georgia"/>
-                <a:cs typeface="Georgia"/>
-              </a:rPr>
-              <a:t> </a:t>
-            </a:r>
-            <a:r>
-              <a:rPr dirty="0" sz="1200" spc="-50" b="0">
-                <a:latin typeface="Lucida Sans Unicode"/>
-                <a:cs typeface="Lucida Sans Unicode"/>
-              </a:rPr>
-              <a:t>= </a:t>
-            </a:r>
-            <a:r>
-              <a:rPr dirty="0" sz="1200" b="0" i="1">
+              <a:t>x,</a:t>
+            </a:r>
+            <a:r>
+              <a:rPr dirty="0" spc="-65" b="0" i="1">
                 <a:latin typeface="Calibri"/>
                 <a:cs typeface="Calibri"/>
               </a:rPr>
-              <a:t>c</a:t>
-            </a:r>
-            <a:r>
-              <a:rPr dirty="0" baseline="31250" sz="1200" b="0">
-                <a:latin typeface="Georgia"/>
-                <a:cs typeface="Georgia"/>
-              </a:rPr>
-              <a:t>2</a:t>
-            </a:r>
-            <a:r>
-              <a:rPr dirty="0" sz="1200"/>
+              <a:t> </a:t>
+            </a:r>
+            <a:r>
+              <a:rPr dirty="0" b="0" i="1">
+                <a:latin typeface="Calibri"/>
+                <a:cs typeface="Calibri"/>
+              </a:rPr>
+              <a:t>y</a:t>
+            </a:r>
+            <a:r>
+              <a:rPr dirty="0" b="0">
+                <a:latin typeface="Tahoma"/>
+                <a:cs typeface="Tahoma"/>
+              </a:rPr>
               <a:t>)</a:t>
             </a:r>
             <a:r>
-              <a:rPr dirty="0" sz="1200" spc="105"/>
-              <a:t> </a:t>
-            </a:r>
-            <a:r>
-              <a:rPr dirty="0" sz="1200" spc="-10"/>
+              <a:rPr dirty="0"/>
+              <a:t>)</a:t>
+            </a:r>
+            <a:r>
+              <a:rPr dirty="0" spc="165"/>
+              <a:t> </a:t>
+            </a:r>
+            <a:r>
+              <a:rPr dirty="0" spc="-30"/>
               <a:t>Example</a:t>
             </a:r>
-            <a:endParaRPr sz="1200">
-              <a:latin typeface="Georgia"/>
-              <a:cs typeface="Georgia"/>
-            </a:endParaRPr>
           </a:p>
         </p:txBody>
       </p:sp>
@@ -4340,7 +4402,7 @@
             </a:r>
             <a:r>
               <a:rPr dirty="0" spc="-50"/>
-              <a:t>8</a:t>
+              <a:t>9</a:t>
             </a:r>
           </a:p>
         </p:txBody>
@@ -7584,7 +7646,7 @@
             </a:r>
             <a:r>
               <a:rPr dirty="0" spc="-50"/>
-              <a:t>8</a:t>
+              <a:t>9</a:t>
             </a:r>
           </a:p>
         </p:txBody>
@@ -7959,7 +8021,7 @@
             </a:r>
             <a:r>
               <a:rPr dirty="0" spc="-50"/>
-              <a:t>8</a:t>
+              <a:t>9</a:t>
             </a:r>
           </a:p>
         </p:txBody>
@@ -8435,6 +8497,394 @@
       </p:grpSpPr>
       <p:sp>
         <p:nvSpPr>
+          <p:cNvPr id="2" name="object 2" descr=""/>
+          <p:cNvSpPr txBox="1"/>
+          <p:nvPr/>
+        </p:nvSpPr>
+        <p:spPr>
+          <a:xfrm>
+            <a:off x="215049" y="39177"/>
+            <a:ext cx="527685" cy="207645"/>
+          </a:xfrm>
+          <a:prstGeom prst="rect">
+            <a:avLst/>
+          </a:prstGeom>
+        </p:spPr>
+        <p:txBody>
+          <a:bodyPr wrap="square" lIns="0" tIns="12065" rIns="0" bIns="0" rtlCol="0" vert="horz">
+            <a:spAutoFit/>
+          </a:bodyPr>
+          <a:lstStyle/>
+          <a:p>
+            <a:pPr marL="12700">
+              <a:lnSpc>
+                <a:spcPct val="100000"/>
+              </a:lnSpc>
+              <a:spcBef>
+                <a:spcPts val="95"/>
+              </a:spcBef>
+            </a:pPr>
+            <a:r>
+              <a:rPr dirty="0" sz="1200" spc="-40" b="1">
+                <a:solidFill>
+                  <a:srgbClr val="E5E5FF"/>
+                </a:solidFill>
+                <a:latin typeface="Georgia"/>
+                <a:cs typeface="Georgia"/>
+              </a:rPr>
+              <a:t>Videos</a:t>
+            </a:r>
+            <a:endParaRPr sz="1200">
+              <a:latin typeface="Georgia"/>
+              <a:cs typeface="Georgia"/>
+            </a:endParaRPr>
+          </a:p>
+        </p:txBody>
+      </p:sp>
+      <p:pic>
+        <p:nvPicPr>
+          <p:cNvPr id="3" name="object 3" descr=""/>
+          <p:cNvPicPr/>
+          <p:nvPr/>
+        </p:nvPicPr>
+        <p:blipFill>
+          <a:blip r:embed="rId2" cstate="print"/>
+          <a:stretch>
+            <a:fillRect/>
+          </a:stretch>
+        </p:blipFill>
+        <p:spPr>
+          <a:xfrm>
+            <a:off x="4356049" y="0"/>
+            <a:ext cx="251955" cy="250939"/>
+          </a:xfrm>
+          <a:prstGeom prst="rect">
+            <a:avLst/>
+          </a:prstGeom>
+        </p:spPr>
+      </p:pic>
+      <p:pic>
+        <p:nvPicPr>
+          <p:cNvPr id="4" name="object 4" descr=""/>
+          <p:cNvPicPr/>
+          <p:nvPr/>
+        </p:nvPicPr>
+        <p:blipFill>
+          <a:blip r:embed="rId3" cstate="print"/>
+          <a:stretch>
+            <a:fillRect/>
+          </a:stretch>
+        </p:blipFill>
+        <p:spPr>
+          <a:xfrm>
+            <a:off x="360032" y="527232"/>
+            <a:ext cx="3888028" cy="2203216"/>
+          </a:xfrm>
+          <a:prstGeom prst="rect">
+            <a:avLst/>
+          </a:prstGeom>
+        </p:spPr>
+      </p:pic>
+      <p:sp>
+        <p:nvSpPr>
+          <p:cNvPr id="5" name="object 5" descr=""/>
+          <p:cNvSpPr txBox="1"/>
+          <p:nvPr/>
+        </p:nvSpPr>
+        <p:spPr>
+          <a:xfrm>
+            <a:off x="840168" y="2802006"/>
+            <a:ext cx="2927985" cy="177800"/>
+          </a:xfrm>
+          <a:prstGeom prst="rect">
+            <a:avLst/>
+          </a:prstGeom>
+        </p:spPr>
+        <p:txBody>
+          <a:bodyPr wrap="square" lIns="0" tIns="12065" rIns="0" bIns="0" rtlCol="0" vert="horz">
+            <a:spAutoFit/>
+          </a:bodyPr>
+          <a:lstStyle/>
+          <a:p>
+            <a:pPr marL="12700">
+              <a:lnSpc>
+                <a:spcPct val="100000"/>
+              </a:lnSpc>
+              <a:spcBef>
+                <a:spcPts val="95"/>
+              </a:spcBef>
+            </a:pPr>
+            <a:r>
+              <a:rPr dirty="0" sz="1000" spc="-10" b="1">
+                <a:solidFill>
+                  <a:srgbClr val="22373A"/>
+                </a:solidFill>
+                <a:latin typeface="Georgia"/>
+                <a:cs typeface="Georgia"/>
+              </a:rPr>
+              <a:t>Figure</a:t>
+            </a:r>
+            <a:r>
+              <a:rPr dirty="0" sz="1000" spc="35" b="1">
+                <a:solidFill>
+                  <a:srgbClr val="22373A"/>
+                </a:solidFill>
+                <a:latin typeface="Georgia"/>
+                <a:cs typeface="Georgia"/>
+              </a:rPr>
+              <a:t> </a:t>
+            </a:r>
+            <a:r>
+              <a:rPr dirty="0" sz="1000" b="1">
+                <a:solidFill>
+                  <a:srgbClr val="22373A"/>
+                </a:solidFill>
+                <a:latin typeface="Georgia"/>
+                <a:cs typeface="Georgia"/>
+              </a:rPr>
+              <a:t>2:</a:t>
+            </a:r>
+            <a:r>
+              <a:rPr dirty="0" sz="1000" spc="145" b="1">
+                <a:solidFill>
+                  <a:srgbClr val="22373A"/>
+                </a:solidFill>
+                <a:latin typeface="Georgia"/>
+                <a:cs typeface="Georgia"/>
+              </a:rPr>
+              <a:t> </a:t>
+            </a:r>
+            <a:r>
+              <a:rPr dirty="0" sz="1000">
+                <a:solidFill>
+                  <a:srgbClr val="22373A"/>
+                </a:solidFill>
+                <a:latin typeface="Georgia"/>
+                <a:cs typeface="Georgia"/>
+              </a:rPr>
+              <a:t>Plum</a:t>
+            </a:r>
+            <a:r>
+              <a:rPr dirty="0" sz="1000" spc="15">
+                <a:solidFill>
+                  <a:srgbClr val="22373A"/>
+                </a:solidFill>
+                <a:latin typeface="Georgia"/>
+                <a:cs typeface="Georgia"/>
+              </a:rPr>
+              <a:t> </a:t>
+            </a:r>
+            <a:r>
+              <a:rPr dirty="0" sz="1000">
+                <a:solidFill>
+                  <a:srgbClr val="22373A"/>
+                </a:solidFill>
+                <a:latin typeface="Georgia"/>
+                <a:cs typeface="Georgia"/>
+              </a:rPr>
+              <a:t>and</a:t>
+            </a:r>
+            <a:r>
+              <a:rPr dirty="0" sz="1000" spc="20">
+                <a:solidFill>
+                  <a:srgbClr val="22373A"/>
+                </a:solidFill>
+                <a:latin typeface="Georgia"/>
+                <a:cs typeface="Georgia"/>
+              </a:rPr>
+              <a:t> </a:t>
+            </a:r>
+            <a:r>
+              <a:rPr dirty="0" sz="1000" spc="-10">
+                <a:solidFill>
+                  <a:srgbClr val="22373A"/>
+                </a:solidFill>
+                <a:latin typeface="Georgia"/>
+                <a:cs typeface="Georgia"/>
+              </a:rPr>
+              <a:t>Popcorn</a:t>
+            </a:r>
+            <a:r>
+              <a:rPr dirty="0" sz="1000" spc="20">
+                <a:solidFill>
+                  <a:srgbClr val="22373A"/>
+                </a:solidFill>
+                <a:latin typeface="Georgia"/>
+                <a:cs typeface="Georgia"/>
+              </a:rPr>
+              <a:t> </a:t>
+            </a:r>
+            <a:r>
+              <a:rPr dirty="0" sz="1000">
+                <a:solidFill>
+                  <a:srgbClr val="22373A"/>
+                </a:solidFill>
+                <a:latin typeface="Georgia"/>
+                <a:cs typeface="Georgia"/>
+              </a:rPr>
+              <a:t>(</a:t>
+            </a:r>
+            <a:r>
+              <a:rPr dirty="0" u="sng" sz="1000">
+                <a:solidFill>
+                  <a:srgbClr val="FF0000"/>
+                </a:solidFill>
+                <a:uFill>
+                  <a:solidFill>
+                    <a:srgbClr val="FF0000"/>
+                  </a:solidFill>
+                </a:uFill>
+                <a:latin typeface="Georgia"/>
+                <a:cs typeface="Georgia"/>
+                <a:hlinkClick r:id="rId4"/>
+              </a:rPr>
+              <a:t>video</a:t>
+            </a:r>
+            <a:r>
+              <a:rPr dirty="0" sz="1000">
+                <a:solidFill>
+                  <a:srgbClr val="22373A"/>
+                </a:solidFill>
+                <a:latin typeface="Georgia"/>
+                <a:cs typeface="Georgia"/>
+              </a:rPr>
+              <a:t>)</a:t>
+            </a:r>
+            <a:r>
+              <a:rPr dirty="0" sz="1000" spc="20">
+                <a:solidFill>
+                  <a:srgbClr val="22373A"/>
+                </a:solidFill>
+                <a:latin typeface="Georgia"/>
+                <a:cs typeface="Georgia"/>
+              </a:rPr>
+              <a:t> </a:t>
+            </a:r>
+            <a:r>
+              <a:rPr dirty="0" sz="1000">
+                <a:solidFill>
+                  <a:srgbClr val="22373A"/>
+                </a:solidFill>
+                <a:latin typeface="Georgia"/>
+                <a:cs typeface="Georgia"/>
+              </a:rPr>
+              <a:t>on</a:t>
+            </a:r>
+            <a:r>
+              <a:rPr dirty="0" sz="1000" spc="15">
+                <a:solidFill>
+                  <a:srgbClr val="22373A"/>
+                </a:solidFill>
+                <a:latin typeface="Georgia"/>
+                <a:cs typeface="Georgia"/>
+              </a:rPr>
+              <a:t> </a:t>
+            </a:r>
+            <a:r>
+              <a:rPr dirty="0" sz="1000" spc="-10">
+                <a:solidFill>
+                  <a:srgbClr val="22373A"/>
+                </a:solidFill>
+                <a:latin typeface="Georgia"/>
+                <a:cs typeface="Georgia"/>
+              </a:rPr>
+              <a:t>18/2/2025</a:t>
+            </a:r>
+            <a:endParaRPr sz="1000">
+              <a:latin typeface="Georgia"/>
+              <a:cs typeface="Georgia"/>
+            </a:endParaRPr>
+          </a:p>
+        </p:txBody>
+      </p:sp>
+      <p:sp>
+        <p:nvSpPr>
+          <p:cNvPr id="6" name="object 6" descr=""/>
+          <p:cNvSpPr txBox="1">
+            <a:spLocks noGrp="1"/>
+          </p:cNvSpPr>
+          <p:nvPr>
+            <p:ph type="sldNum" idx="7" sz="quarter"/>
+          </p:nvPr>
+        </p:nvSpPr>
+        <p:spPr>
+          <a:prstGeom prst="rect"/>
+        </p:spPr>
+        <p:txBody>
+          <a:bodyPr wrap="square" lIns="0" tIns="21590" rIns="0" bIns="0" rtlCol="0" vert="horz">
+            <a:spAutoFit/>
+          </a:bodyPr>
+          <a:lstStyle/>
+          <a:p>
+            <a:pPr marL="12700">
+              <a:lnSpc>
+                <a:spcPct val="100000"/>
+              </a:lnSpc>
+              <a:spcBef>
+                <a:spcPts val="170"/>
+              </a:spcBef>
+            </a:pPr>
+            <a:r>
+              <a:rPr dirty="0" spc="75"/>
+              <a:t>Page</a:t>
+            </a:r>
+            <a:r>
+              <a:rPr dirty="0" spc="125"/>
+              <a:t> </a:t>
+            </a:r>
+            <a:fld id="{81D60167-4931-47E6-BA6A-407CBD079E47}" type="slidenum">
+              <a:rPr dirty="0"/>
+              <a:t>5</a:t>
+            </a:fld>
+            <a:r>
+              <a:rPr dirty="0" spc="130"/>
+              <a:t> </a:t>
+            </a:r>
+            <a:r>
+              <a:rPr dirty="0" spc="60"/>
+              <a:t>/</a:t>
+            </a:r>
+            <a:r>
+              <a:rPr dirty="0" spc="135"/>
+              <a:t> </a:t>
+            </a:r>
+            <a:r>
+              <a:rPr dirty="0" spc="-50"/>
+              <a:t>9</a:t>
+            </a:r>
+          </a:p>
+        </p:txBody>
+      </p:sp>
+    </p:spTree>
+  </p:cSld>
+  <p:clrMapOvr>
+    <a:masterClrMapping/>
+  </p:clrMapOvr>
+  <p:transition spd="fast">
+    <p:cut thruBlk="0"/>
+  </p:transition>
+</p:sld>
+</file>
+
+<file path=ppt/slides/slide8.xml><?xml version="1.0" encoding="utf-8"?>
+<p:sld xmlns:a="http://schemas.openxmlformats.org/drawingml/2006/main" xmlns:r="http://schemas.openxmlformats.org/officeDocument/2006/relationships" xmlns:p="http://schemas.openxmlformats.org/presentationml/2006/main">
+  <p:cSld>
+    <p:spTree>
+      <p:nvGrpSpPr>
+        <p:cNvPr id="1" name=""/>
+        <p:cNvGrpSpPr/>
+        <p:nvPr/>
+      </p:nvGrpSpPr>
+      <p:grpSpPr>
+        <a:xfrm>
+          <a:off x="0" y="0"/>
+          <a:ext cx="0" cy="0"/>
+          <a:chOff x="0" y="0"/>
+          <a:chExt cx="0" cy="0"/>
+        </a:xfrm>
+      </p:grpSpPr>
+      <p:sp>
+        <p:nvSpPr>
           <p:cNvPr id="2" name="object 2"/>
           <p:cNvSpPr txBox="1">
             <a:spLocks noGrp="1"/>
@@ -8444,10 +8894,6 @@
           </p:nvPr>
         </p:nvSpPr>
         <p:spPr>
-          <a:xfrm>
-            <a:off x="215049" y="39177"/>
-            <a:ext cx="2571115" cy="207645"/>
-          </a:xfrm>
           <a:prstGeom prst="rect"/>
         </p:spPr>
         <p:txBody>
@@ -9262,7 +9708,7 @@
             </a:r>
             <a:fld id="{81D60167-4931-47E6-BA6A-407CBD079E47}" type="slidenum">
               <a:rPr dirty="0"/>
-              <a:t>5</a:t>
+              <a:t>8</a:t>
             </a:fld>
             <a:r>
               <a:rPr dirty="0" spc="130"/>
@@ -9278,7 +9724,7 @@
             </a:r>
             <a:r>
               <a:rPr dirty="0" spc="-50"/>
-              <a:t>8</a:t>
+              <a:t>9</a:t>
             </a:r>
           </a:p>
         </p:txBody>
@@ -9294,7 +9740,7 @@
 </p:sld>
 </file>
 
-<file path=ppt/slides/slide8.xml><?xml version="1.0" encoding="utf-8"?>
+<file path=ppt/slides/slide9.xml><?xml version="1.0" encoding="utf-8"?>
 <p:sld xmlns:a="http://schemas.openxmlformats.org/drawingml/2006/main" xmlns:r="http://schemas.openxmlformats.org/officeDocument/2006/relationships" xmlns:p="http://schemas.openxmlformats.org/presentationml/2006/main">
   <p:cSld>
     <p:spTree>
@@ -9450,7 +9896,7 @@
             </a:r>
             <a:fld id="{81D60167-4931-47E6-BA6A-407CBD079E47}" type="slidenum">
               <a:rPr dirty="0"/>
-              <a:t>5</a:t>
+              <a:t>8</a:t>
             </a:fld>
             <a:r>
               <a:rPr dirty="0" spc="130"/>
@@ -9466,7 +9912,7 @@
             </a:r>
             <a:r>
               <a:rPr dirty="0" spc="-50"/>
-              <a:t>8</a:t>
+              <a:t>9</a:t>
             </a:r>
           </a:p>
         </p:txBody>

</xml_diff>